<commit_message>
push changes in identifier
</commit_message>
<xml_diff>
--- a/Day_1/Lectures/Day_1_Lecture_Arch.pptx
+++ b/Day_1/Lectures/Day_1_Lecture_Arch.pptx
@@ -1376,13 +1376,9 @@
             </a:r>
             <a:r>
               <a:rPr lang="en-US" baseline="0" dirty="0" smtClean="0"/>
-              <a:t> different contexts of planning, use, </a:t>
-            </a:r>
-            <a:r>
-              <a:rPr lang="en-US" baseline="0" smtClean="0"/>
-              <a:t>and reuse. </a:t>
-            </a:r>
-            <a:endParaRPr lang="en-US"/>
+              <a:t> different contexts of planning, use, and reuse. </a:t>
+            </a:r>
+            <a:endParaRPr lang="en-US" dirty="0"/>
           </a:p>
         </p:txBody>
       </p:sp>
@@ -4892,19 +4888,8 @@
                 <a:latin typeface="American Typewriter"/>
                 <a:cs typeface="American Typewriter"/>
               </a:rPr>
-              <a:t>Pablo Picasso, Spanish, 1881-1973, in Paris after </a:t>
-            </a:r>
-            <a:r>
-              <a:rPr lang="en-US" sz="2000" dirty="0" smtClean="0">
-                <a:latin typeface="American Typewriter"/>
-                <a:cs typeface="American Typewriter"/>
-              </a:rPr>
-              <a:t>1904</a:t>
-            </a:r>
-            <a:endParaRPr lang="en-US" sz="2000" dirty="0" smtClean="0">
-              <a:latin typeface="American Typewriter"/>
-              <a:cs typeface="American Typewriter"/>
-            </a:endParaRPr>
+              <a:t>Pablo Picasso, Spanish, 1881-1973, in Paris after 1904</a:t>
+            </a:r>
           </a:p>
           <a:p>
             <a:pPr marL="0" indent="0">
@@ -4922,19 +4907,8 @@
                 <a:latin typeface="American Typewriter"/>
                 <a:cs typeface="American Typewriter"/>
               </a:rPr>
-              <a:t>Guitar on a </a:t>
-            </a:r>
-            <a:r>
-              <a:rPr lang="en-US" sz="2000" i="1" dirty="0" smtClean="0">
-                <a:latin typeface="American Typewriter"/>
-                <a:cs typeface="American Typewriter"/>
-              </a:rPr>
-              <a:t>Table</a:t>
-            </a:r>
-            <a:endParaRPr lang="en-US" sz="2000" i="1" dirty="0" smtClean="0">
-              <a:latin typeface="American Typewriter"/>
-              <a:cs typeface="American Typewriter"/>
-            </a:endParaRPr>
+              <a:t>Guitar on a Table</a:t>
+            </a:r>
           </a:p>
           <a:p>
             <a:pPr marL="0" indent="0">
@@ -4954,10 +4928,6 @@
               </a:rPr>
               <a:t>1912</a:t>
             </a:r>
-            <a:endParaRPr lang="en-US" sz="2000" dirty="0" smtClean="0">
-              <a:latin typeface="American Typewriter"/>
-              <a:cs typeface="American Typewriter"/>
-            </a:endParaRPr>
           </a:p>
           <a:p>
             <a:pPr marL="0" indent="0">
@@ -4968,40 +4938,15 @@
                 <a:latin typeface="American Typewriter"/>
                 <a:cs typeface="American Typewriter"/>
               </a:rPr>
-              <a:t>&lt;medium</a:t>
-            </a:r>
-            <a:r>
-              <a:rPr lang="en-US" sz="2000" b="1" dirty="0" smtClean="0">
-                <a:latin typeface="American Typewriter"/>
-                <a:cs typeface="American Typewriter"/>
-              </a:rPr>
-              <a:t>&gt; </a:t>
+              <a:t>&lt;medium&gt; </a:t>
             </a:r>
             <a:r>
               <a:rPr lang="en-US" sz="2000" dirty="0" smtClean="0">
                 <a:latin typeface="American Typewriter"/>
                 <a:cs typeface="American Typewriter"/>
               </a:rPr>
-              <a:t>Oil</a:t>
-            </a:r>
-            <a:r>
-              <a:rPr lang="en-US" sz="2000" dirty="0" smtClean="0">
-                <a:latin typeface="American Typewriter"/>
-                <a:cs typeface="American Typewriter"/>
-              </a:rPr>
-              <a:t>, sand, and charcoal on </a:t>
-            </a:r>
-            <a:r>
-              <a:rPr lang="en-US" sz="2000" dirty="0" smtClean="0">
-                <a:latin typeface="American Typewriter"/>
-                <a:cs typeface="American Typewriter"/>
-              </a:rPr>
-              <a:t>canvas</a:t>
-            </a:r>
-            <a:endParaRPr lang="en-US" sz="2000" dirty="0" smtClean="0">
-              <a:latin typeface="American Typewriter"/>
-              <a:cs typeface="American Typewriter"/>
-            </a:endParaRPr>
+              <a:t>Oil, sand, and charcoal on canvas</a:t>
+            </a:r>
           </a:p>
           <a:p>
             <a:pPr marL="0" indent="0">
@@ -5019,19 +4964,8 @@
                 <a:latin typeface="American Typewriter"/>
                 <a:cs typeface="American Typewriter"/>
               </a:rPr>
-              <a:t>20 1/8 x 24 1/4 in (51.1 x 61.6 cm</a:t>
-            </a:r>
-            <a:r>
-              <a:rPr lang="en-US" sz="2000" dirty="0" smtClean="0">
-                <a:latin typeface="American Typewriter"/>
-                <a:cs typeface="American Typewriter"/>
-              </a:rPr>
-              <a:t>)</a:t>
-            </a:r>
-            <a:endParaRPr lang="en-US" sz="2000" dirty="0" smtClean="0">
-              <a:latin typeface="American Typewriter"/>
-              <a:cs typeface="American Typewriter"/>
-            </a:endParaRPr>
+              <a:t>20 1/8 x 24 1/4 in (51.1 x 61.6 cm)</a:t>
+            </a:r>
           </a:p>
           <a:p>
             <a:pPr marL="0" indent="0">
@@ -5148,7 +5082,7 @@
         </p:blipFill>
         <p:spPr>
           <a:xfrm>
-            <a:off x="0" y="216367"/>
+            <a:off x="0" y="189154"/>
             <a:ext cx="9144000" cy="5550851"/>
           </a:xfrm>
           <a:prstGeom prst="rect">
@@ -5489,14 +5423,7 @@
               <a:rPr lang="en-US" dirty="0" smtClean="0"/>
               <a:t>Provenance</a:t>
             </a:r>
-          </a:p>
-          <a:p>
-            <a:pPr lvl="1"/>
-            <a:r>
-              <a:rPr lang="en-US" dirty="0" smtClean="0"/>
-              <a:t>Disposal </a:t>
-            </a:r>
-            <a:endParaRPr lang="en-US" dirty="0"/>
+            <a:endParaRPr lang="en-US" dirty="0" smtClean="0"/>
           </a:p>
         </p:txBody>
       </p:sp>
@@ -5859,11 +5786,15 @@
           <a:p>
             <a:r>
               <a:rPr lang="en-US" dirty="0" smtClean="0"/>
-              <a:t>Respect “du </a:t>
+              <a:t>Respect “</a:t>
+            </a:r>
+            <a:r>
+              <a:rPr lang="en-US" dirty="0" smtClean="0"/>
+              <a:t>des </a:t>
             </a:r>
             <a:r>
               <a:rPr lang="en-US" dirty="0" err="1" smtClean="0"/>
-              <a:t>fondes</a:t>
+              <a:t>fonds</a:t>
             </a:r>
             <a:r>
               <a:rPr lang="en-US" dirty="0" smtClean="0"/>

</xml_diff>